<commit_message>
chore: some ppt note changes
</commit_message>
<xml_diff>
--- a/Báo cáo/GraduationThesis.pptx
+++ b/Báo cáo/GraduationThesis.pptx
@@ -560,7 +560,7 @@
               <a:rPr lang="en-US" dirty="0">
                 <a:effectLst/>
               </a:rPr>
-              <a:t>Hello, I am Quang Vinh, thanks for coming to my thesis defense presentation today, which is titled: “Developing a Mushroom Identification Application. Advised by Dr. BVQB</a:t>
+              <a:t>Hello everyone, I am Quang Vinh, thanks for coming to my thesis defense presentation today, which is titled: “Developing a Mushroom Identification Application. Advised by Dr. BVQB</a:t>
             </a:r>
             <a:endParaRPr lang="en-US" dirty="0"/>
           </a:p>
@@ -2914,8 +2914,10 @@
           <a:lstStyle/>
           <a:p>
             <a:r>
-              <a:rPr lang="en-US" dirty="0"/>
-              <a:t>It is known that mushroom identification is a difficult task for most beginner due to how similar most mushroom species looks.</a:t>
+              <a:rPr lang="en-US" dirty="0">
+                <a:effectLst/>
+              </a:rPr>
+              <a:t>Mushroom identification is known to be a difficult task for beginners - due how similar most species look, which can lead to possibly errors EVEN with prior knowledge.</a:t>
             </a:r>
           </a:p>
           <a:p>
@@ -2924,16 +2926,7 @@
           <a:p>
             <a:r>
               <a:rPr lang="en-US" dirty="0"/>
-              <a:t>Which spawn errors despite prior knowledge </a:t>
-            </a:r>
-          </a:p>
-          <a:p>
-            <a:endParaRPr lang="en-US" dirty="0"/>
-          </a:p>
-          <a:p>
-            <a:r>
-              <a:rPr lang="en-US" dirty="0"/>
-              <a:t>And With the increase in interest for foraging, there has been demand a tool that is beginner friendly </a:t>
+              <a:t>And with the increase in interest for foraging hobby, there has been demand for accessible and beginner friendly tools</a:t>
             </a:r>
           </a:p>
           <a:p>
@@ -3082,7 +3075,7 @@
               <a:rPr lang="en-US" dirty="0">
                 <a:effectLst/>
               </a:rPr>
-              <a:t>And thus spawn this thesis that aims to develop a beginner-friendly Android application </a:t>
+              <a:t>And thus spawn this thesis which aims to develop a beginner-friendly Android application </a:t>
             </a:r>
           </a:p>
           <a:p>
@@ -3132,7 +3125,7 @@
               <a:rPr lang="en-US" dirty="0">
                 <a:effectLst/>
               </a:rPr>
-              <a:t>that supports safe mushroom identification, promotes safe foraging practices, and self-learning for the hobby.</a:t>
+              <a:t>that supports mushroom identification and also promotes safe foraging practices, and self-learning for the hobby.</a:t>
             </a:r>
           </a:p>
           <a:p>
@@ -3260,7 +3253,13 @@
             </a:br>
             <a:r>
               <a:rPr lang="en-US" dirty="0"/>
-              <a:t>Build an app that combine AI-based image identification that stored inferred result locally with a search feature and interactable map delivered with a fast client-server architecture and intuitive UI/UX</a:t>
+              <a:t>1. Build an app that combine AI-based image identification that stored inferred result locally </a:t>
+            </a:r>
+          </a:p>
+          <a:p>
+            <a:r>
+              <a:rPr lang="en-US" dirty="0"/>
+              <a:t>2. with a search feature and interactable map delivered with a fast client-server architecture and intuitive UI/UX</a:t>
             </a:r>
           </a:p>
           <a:p>
@@ -3294,7 +3293,7 @@
               <a:rPr lang="en-US" dirty="0">
                 <a:effectLst/>
               </a:rPr>
-              <a:t>1. The application is built with Flutter that  integration with the iNaturalist API.</a:t>
+              <a:t>1. The application is built with Flutter that  integrated with the iNaturalist API.</a:t>
             </a:r>
           </a:p>
           <a:p>
@@ -3302,7 +3301,7 @@
               <a:rPr lang="en-US" dirty="0">
                 <a:effectLst/>
               </a:rPr>
-              <a:t>2. While server-side inference used PyTorch on Lightning.ai,</a:t>
+              <a:t>2. While server-side inference used PyTorch on Lightning.ai server,</a:t>
             </a:r>
           </a:p>
           <a:p>
@@ -3310,7 +3309,7 @@
               <a:rPr lang="en-US" dirty="0">
                 <a:effectLst/>
               </a:rPr>
-              <a:t>3. Local SQLite and bunded JSON handle storage</a:t>
+              <a:t>3. With SQLite and bundled JSON handling local storage</a:t>
             </a:r>
             <a:endParaRPr lang="en-US" dirty="0"/>
           </a:p>
@@ -3612,19 +3611,19 @@
           <a:p>
             <a:r>
               <a:rPr lang="en-US" dirty="0"/>
-              <a:t>The model used is &lt;&gt; Google – Vit base patch 16 224 pretrained on ImageNet 21k:</a:t>
+              <a:t>The model used is &lt;&gt; Google – Vit-base-patch16, pretrained on ImageNet-21k:</a:t>
             </a:r>
           </a:p>
           <a:p>
             <a:r>
               <a:rPr lang="en-US" dirty="0"/>
-              <a:t>1. Good for identifying subtle details and complex textures</a:t>
+              <a:t>1. Which is good for identifying subtle details and complex textures</a:t>
             </a:r>
           </a:p>
           <a:p>
             <a:r>
               <a:rPr lang="en-US" dirty="0"/>
-              <a:t>2. And It deliver higher accuracy than the 3 CNN models used for the baseline on the custom dataset</a:t>
+              <a:t>2. And it delivers higher accuracy than the three CNN models used for the baseline on the custom dataset</a:t>
             </a:r>
           </a:p>
         </p:txBody>
@@ -3745,7 +3744,7 @@
             </a:pPr>
             <a:r>
               <a:rPr lang="en-US" dirty="0"/>
-              <a:t>The dataset is 80 classes with 200 samples each result in exactly 16,000 samples total</a:t>
+              <a:t>The dataset consists of 80 classes with 200 samples each resulting in exactly 16,000 samples total</a:t>
             </a:r>
           </a:p>
           <a:p>
@@ -3784,7 +3783,7 @@
                 <a:ea typeface="+mn-ea"/>
                 <a:cs typeface="+mn-cs"/>
               </a:rPr>
-              <a:t>improve generalization</a:t>
+              <a:t>improve generalization just before training</a:t>
             </a:r>
             <a:endParaRPr lang="en-US" dirty="0"/>
           </a:p>
@@ -3903,7 +3902,7 @@
           <a:p>
             <a:r>
               <a:rPr lang="en-US" dirty="0"/>
-              <a:t>These subsequence slides show the overview of the system architecture</a:t>
+              <a:t>These subsequence slides show the overview of the system architecture and uses cases</a:t>
             </a:r>
           </a:p>
         </p:txBody>
@@ -40193,13 +40192,13 @@
           </a:p>
           <a:p>
             <a:r>
-              <a:rPr lang="en-US" b="1" dirty="0"/>
+              <a:rPr lang="en-US" sz="3500" b="1" dirty="0"/>
               <a:t>DEVELOPING A MUSHROOM IDENTIFICATION </a:t>
             </a:r>
           </a:p>
           <a:p>
             <a:r>
-              <a:rPr lang="en-US" b="1" dirty="0"/>
+              <a:rPr lang="en-US" sz="3500" b="1" dirty="0"/>
               <a:t>APPLICATION</a:t>
             </a:r>
           </a:p>
@@ -41040,13 +41039,8 @@
           <a:p>
             <a:r>
               <a:rPr lang="en-US" sz="6000" dirty="0"/>
-              <a:t>2.6. Main </a:t>
+              <a:t>2.6. Mushroom Identification Workflows</a:t>
             </a:r>
-            <a:r>
-              <a:rPr lang="en-US" sz="6000"/>
-              <a:t>System Workflows</a:t>
-            </a:r>
-            <a:endParaRPr lang="en-US" sz="6000" dirty="0"/>
           </a:p>
         </p:txBody>
       </p:sp>
@@ -41224,7 +41218,7 @@
           <a:p>
             <a:r>
               <a:rPr lang="en-US" sz="6000" dirty="0"/>
-              <a:t>2.6. Main System Workflows</a:t>
+              <a:t>2.6. History Workflows</a:t>
             </a:r>
           </a:p>
         </p:txBody>
@@ -41403,7 +41397,7 @@
           <a:p>
             <a:r>
               <a:rPr lang="en-US" sz="6000" dirty="0"/>
-              <a:t>2.6. Main System Workflows</a:t>
+              <a:t>2.6. Search Workflows</a:t>
             </a:r>
           </a:p>
         </p:txBody>
@@ -41582,7 +41576,7 @@
           <a:p>
             <a:r>
               <a:rPr lang="en-US" sz="6000" dirty="0"/>
-              <a:t>2.6. Main System Workflows</a:t>
+              <a:t>2.6. Forage Map Workflows</a:t>
             </a:r>
           </a:p>
         </p:txBody>

</xml_diff>

<commit_message>
chore: ppt note update
</commit_message>
<xml_diff>
--- a/Báo cáo/GraduationThesis.pptx
+++ b/Báo cáo/GraduationThesis.pptx
@@ -225,7 +225,7 @@
           <a:p>
             <a:fld id="{36BB93D1-677A-4727-ACB1-B4ED1776CBF7}" type="datetimeFigureOut">
               <a:rPr lang="vi-VN" smtClean="0"/>
-              <a:t>17/12/2025</a:t>
+              <a:t>18/12/2025</a:t>
             </a:fld>
             <a:endParaRPr lang="vi-VN"/>
           </a:p>
@@ -558,7 +558,7 @@
               <a:rPr lang="en-US" dirty="0">
                 <a:effectLst/>
               </a:rPr>
-              <a:t>Hello everyone, I am Quang Vinh, thanks for coming to my thesis defense presentation today, which is titled: “Developing a Mushroom Identification Application. Advised by Dr. BVQB</a:t>
+              <a:t>Hello everyone, I am Quang Vinh, thanks for coming to my thesis defense presentation today, titled: “Developing a Mushroom Identification Application. Advised by Dr. BVQB</a:t>
             </a:r>
             <a:endParaRPr lang="en-US" dirty="0"/>
           </a:p>
@@ -671,7 +671,7 @@
           <a:p>
             <a:r>
               <a:rPr lang="en-US" dirty="0"/>
-              <a:t>Use case</a:t>
+              <a:t>Overview of the Use case</a:t>
             </a:r>
           </a:p>
         </p:txBody>
@@ -789,7 +789,7 @@
           <a:p>
             <a:r>
               <a:rPr lang="en-US" dirty="0"/>
-              <a:t>Image identification feature workflow</a:t>
+              <a:t>Mushroom identification feature workflow</a:t>
             </a:r>
           </a:p>
         </p:txBody>
@@ -1273,7 +1273,7 @@
             </a:pPr>
             <a:r>
               <a:rPr lang="en-US" dirty="0"/>
-              <a:t>The Model is evaluated on precision, recall and F1 score for each of the 80 classes</a:t>
+              <a:t>The Model is evaluated on the metric of precision, recall and F1 score for each of the 80 classes</a:t>
             </a:r>
           </a:p>
         </p:txBody>
@@ -1534,7 +1534,7 @@
           <a:p>
             <a:r>
               <a:rPr lang="en-US" dirty="0"/>
-              <a:t>Result of the implementation the ViT model achieved consistently higher scores than all baseline models on the custom dataset</a:t>
+              <a:t>The result of the implementation has the ViT model achieved consistently higher scores, than all baseline models on the custom dataset</a:t>
             </a:r>
           </a:p>
         </p:txBody>
@@ -1621,7 +1621,7 @@
           <a:p>
             <a:r>
               <a:rPr lang="en-US" dirty="0"/>
-              <a:t>The following slides are result of the UI implementation for the Mushroom identification feature</a:t>
+              <a:t>The following slides are result of the UI implementation for the Mushroom identification feature,</a:t>
             </a:r>
           </a:p>
         </p:txBody>
@@ -1717,7 +1717,7 @@
               <a:rPr lang="en-US" dirty="0">
                 <a:effectLst/>
               </a:rPr>
-              <a:t>The presentation is organized into four parts:</a:t>
+              <a:t>The presentation is consists of 4 parts:</a:t>
             </a:r>
           </a:p>
           <a:p>
@@ -1741,7 +1741,7 @@
           <a:p>
             <a:r>
               <a:rPr lang="en-US" dirty="0"/>
-              <a:t>4. And the Conclusion</a:t>
+              <a:t>4. And finally the Conclusion</a:t>
             </a:r>
           </a:p>
           <a:p>
@@ -2139,7 +2139,7 @@
             </a:pPr>
             <a:r>
               <a:rPr lang="en-US" dirty="0"/>
-              <a:t>In conclusion the thesis </a:t>
+              <a:t>In the end, the thesis </a:t>
             </a:r>
             <a:r>
               <a:rPr lang="en-US" dirty="0">
@@ -2156,7 +2156,7 @@
               <a:rPr lang="en-US" dirty="0">
                 <a:effectLst/>
               </a:rPr>
-              <a:t>1. real-time image recognition with local result storage, </a:t>
+              <a:t>1. Real-time image recognition with local result storage, </a:t>
             </a:r>
           </a:p>
           <a:p>
@@ -2181,7 +2181,7 @@
               <a:rPr lang="en-US" dirty="0">
                 <a:effectLst/>
               </a:rPr>
-              <a:t>2. keyword-searchable mushroom feature</a:t>
+              <a:t>2. A Keyword-searchable mushroom feature</a:t>
             </a:r>
           </a:p>
           <a:p>
@@ -2206,7 +2206,7 @@
               <a:rPr lang="en-US" dirty="0">
                 <a:effectLst/>
               </a:rPr>
-              <a:t>3. and an interactive map integrated with iNaturalist API.</a:t>
+              <a:t>3. And an interactive map integrated with iNaturalist API.</a:t>
             </a:r>
           </a:p>
           <a:p>
@@ -2270,7 +2270,7 @@
               <a:rPr lang="en-US" dirty="0">
                 <a:effectLst/>
               </a:rPr>
-              <a:t>a relatively constrained dataset, </a:t>
+              <a:t>A relatively constrained dataset, </a:t>
             </a:r>
           </a:p>
           <a:p>
@@ -2295,7 +2295,7 @@
               <a:rPr lang="en-US" dirty="0">
                 <a:effectLst/>
               </a:rPr>
-              <a:t>incomplete mitigation of overfitting, </a:t>
+              <a:t>Low accuracy on certain classes,</a:t>
             </a:r>
           </a:p>
           <a:p>
@@ -2320,32 +2320,7 @@
               <a:rPr lang="en-US" dirty="0">
                 <a:effectLst/>
               </a:rPr>
-              <a:t>low accuracy on certain classes,</a:t>
-            </a:r>
-          </a:p>
-          <a:p>
-            <a:pPr marL="228600" marR="0" lvl="0" indent="-228600" algn="l" defTabSz="914400" rtl="0" eaLnBrk="1" fontAlgn="auto" latinLnBrk="0" hangingPunct="1">
-              <a:lnSpc>
-                <a:spcPct val="100000"/>
-              </a:lnSpc>
-              <a:spcBef>
-                <a:spcPts val="0"/>
-              </a:spcBef>
-              <a:spcAft>
-                <a:spcPts val="0"/>
-              </a:spcAft>
-              <a:buClrTx/>
-              <a:buSzTx/>
-              <a:buFontTx/>
-              <a:buAutoNum type="arabicPeriod"/>
-              <a:tabLst/>
-              <a:defRPr/>
-            </a:pPr>
-            <a:r>
-              <a:rPr lang="en-US" dirty="0">
-                <a:effectLst/>
-              </a:rPr>
-              <a:t>Finally, some features remain underdeveloped.</a:t>
+              <a:t>And some features remain underdeveloped.</a:t>
             </a:r>
           </a:p>
           <a:p>
@@ -2718,7 +2693,7 @@
               <a:rPr lang="en-US" dirty="0">
                 <a:effectLst/>
               </a:rPr>
-              <a:t>Mushroom identification is known to be a difficult task for beginners - due how similar most species look, which can lead to possibly errors EVEN with prior knowledge.</a:t>
+              <a:t>Mushroom identification is known to be a difficult task for beginners - due how similar most species look, which can lead to possibly lethal errors EVEN with prior knowledge.</a:t>
             </a:r>
           </a:p>
           <a:p>
@@ -2727,7 +2702,7 @@
           <a:p>
             <a:r>
               <a:rPr lang="en-US" dirty="0"/>
-              <a:t>And with the increase in interest for foraging hobby, there has been demand for accessible and beginner friendly tools</a:t>
+              <a:t>And with the increase in interest for foraging hobby, there has been demand for an accessible and beginner-friendly tool</a:t>
             </a:r>
           </a:p>
           <a:p>
@@ -2739,7 +2714,7 @@
           <a:p>
             <a:r>
               <a:rPr lang="en-US" dirty="0"/>
-              <a:t>without an expensive subscription or the restrictive freemium models</a:t>
+              <a:t>That does not have the users dealing with an expensive subscription  or a restrictive freemium model</a:t>
             </a:r>
           </a:p>
         </p:txBody>
@@ -3047,20 +3022,20 @@
           <a:p>
             <a:r>
               <a:rPr lang="en-US" dirty="0"/>
-              <a:t>Objectives:</a:t>
+              <a:t>The Objectives of the thesis is to :</a:t>
             </a:r>
             <a:br>
               <a:rPr lang="en-US" dirty="0"/>
             </a:br>
             <a:r>
               <a:rPr lang="en-US" dirty="0"/>
-              <a:t>1. Build an app that combine AI-based image identification that stored inferred result locally </a:t>
+              <a:t>1. Build an app that combine AI-based image identification that stored results locally </a:t>
             </a:r>
           </a:p>
           <a:p>
             <a:r>
               <a:rPr lang="en-US" dirty="0"/>
-              <a:t>2. with a search feature and interactable map DELIVERED with a fast client-server architecture and intuitive UI/UX</a:t>
+              <a:t>2. with a search feature and interactable forage map DELIVERED with a fast client-server architecture and intuitive UI/UX</a:t>
             </a:r>
           </a:p>
           <a:p>
@@ -3102,7 +3077,7 @@
               <a:rPr lang="en-US" dirty="0">
                 <a:effectLst/>
               </a:rPr>
-              <a:t>2. With server inference via PyTorch and Lightning.ai</a:t>
+              <a:t>2. With server inference task done via PyTorch on Lightning.ai server</a:t>
             </a:r>
           </a:p>
           <a:p>
@@ -3110,7 +3085,7 @@
               <a:rPr lang="en-US" dirty="0">
                 <a:effectLst/>
               </a:rPr>
-              <a:t>3. And local storage handled by SQLite and bundled JSON</a:t>
+              <a:t>3. And local storage is handled by SQLite and bundled JSON</a:t>
             </a:r>
             <a:endParaRPr lang="en-US" dirty="0"/>
           </a:p>
@@ -3266,7 +3241,7 @@
           <a:p>
             <a:r>
               <a:rPr lang="en-US" dirty="0"/>
-              <a:t>3. OpenStreetMap (via </a:t>
+              <a:t>3. OpenStreetMap Data (via </a:t>
             </a:r>
             <a:r>
               <a:rPr lang="af-ZA" sz="1200" kern="1200" dirty="0">
@@ -3294,7 +3269,7 @@
           <a:p>
             <a:r>
               <a:rPr lang="en-US" dirty="0"/>
-              <a:t>5. And FastAPI with LitServe on Lightning.ai for deploying the AI model</a:t>
+              <a:t>5. And FastAPI with LitServe on Lightning.ai for deploying the model</a:t>
             </a:r>
           </a:p>
         </p:txBody>
@@ -3433,15 +3408,6 @@
               <a:t>While offer good performance on identifying subtle details and complex textures</a:t>
             </a:r>
           </a:p>
-          <a:p>
-            <a:pPr marL="228600" indent="-228600">
-              <a:buAutoNum type="arabicPeriod"/>
-            </a:pPr>
-            <a:r>
-              <a:rPr lang="en-US" dirty="0"/>
-              <a:t>And delivers better results compare to the 3 CNN models used as the baseline on the custom dataset</a:t>
-            </a:r>
-          </a:p>
         </p:txBody>
       </p:sp>
       <p:sp>
@@ -3578,7 +3544,7 @@
             </a:pPr>
             <a:r>
               <a:rPr lang="en-US" dirty="0"/>
-              <a:t>The Dataset is split with the ratio 8:1:1 for the training, validation and test set respectively</a:t>
+              <a:t>The Dataset is split with the ratio 8:1:1 for the train, validate and test set respectively</a:t>
             </a:r>
           </a:p>
           <a:p>
@@ -3587,7 +3553,7 @@
             </a:pPr>
             <a:r>
               <a:rPr lang="en-US" dirty="0"/>
-              <a:t>Augmentation is applied to the train set just before training to </a:t>
+              <a:t>The Augmentation is applied to the train set just before training to </a:t>
             </a:r>
             <a:r>
               <a:rPr lang="en-US" sz="1200" kern="1200" dirty="0">
@@ -3718,7 +3684,7 @@
           <a:p>
             <a:r>
               <a:rPr lang="en-US" dirty="0"/>
-              <a:t>These subsequence slides show the overview of the system architecture, uses case and the workflow of the main features</a:t>
+              <a:t>These subsequence slides show the overview of the system architecture, </a:t>
             </a:r>
           </a:p>
         </p:txBody>
@@ -4553,7 +4519,7 @@
             <a:fld id="{D86B3AB3-BDCC-41BF-8781-963E853753C3}" type="datetime1">
               <a:rPr lang="en-US" smtClean="0"/>
               <a:pPr/>
-              <a:t>17-Dec-25</a:t>
+              <a:t>18-Dec-25</a:t>
             </a:fld>
             <a:endParaRPr lang="en-US"/>
           </a:p>
@@ -5826,7 +5792,7 @@
             <a:fld id="{D86B3AB3-BDCC-41BF-8781-963E853753C3}" type="datetime1">
               <a:rPr lang="en-US" smtClean="0"/>
               <a:pPr/>
-              <a:t>17-Dec-25</a:t>
+              <a:t>18-Dec-25</a:t>
             </a:fld>
             <a:endParaRPr lang="en-US"/>
           </a:p>
@@ -6923,7 +6889,7 @@
             <a:fld id="{D86B3AB3-BDCC-41BF-8781-963E853753C3}" type="datetime1">
               <a:rPr lang="en-US" smtClean="0"/>
               <a:pPr/>
-              <a:t>17-Dec-25</a:t>
+              <a:t>18-Dec-25</a:t>
             </a:fld>
             <a:endParaRPr lang="en-US"/>
           </a:p>
@@ -8048,7 +8014,7 @@
             <a:fld id="{D86B3AB3-BDCC-41BF-8781-963E853753C3}" type="datetime1">
               <a:rPr lang="en-US" smtClean="0"/>
               <a:pPr/>
-              <a:t>17-Dec-25</a:t>
+              <a:t>18-Dec-25</a:t>
             </a:fld>
             <a:endParaRPr lang="en-US"/>
           </a:p>
@@ -9031,7 +8997,7 @@
             <a:fld id="{D86B3AB3-BDCC-41BF-8781-963E853753C3}" type="datetime1">
               <a:rPr lang="en-US" smtClean="0"/>
               <a:pPr/>
-              <a:t>17-Dec-25</a:t>
+              <a:t>18-Dec-25</a:t>
             </a:fld>
             <a:endParaRPr lang="en-US"/>
           </a:p>
@@ -10014,7 +9980,7 @@
             <a:fld id="{D86B3AB3-BDCC-41BF-8781-963E853753C3}" type="datetime1">
               <a:rPr lang="en-US" smtClean="0"/>
               <a:pPr/>
-              <a:t>17-Dec-25</a:t>
+              <a:t>18-Dec-25</a:t>
             </a:fld>
             <a:endParaRPr lang="en-US"/>
           </a:p>
@@ -11018,7 +10984,7 @@
             <a:fld id="{D86B3AB3-BDCC-41BF-8781-963E853753C3}" type="datetime1">
               <a:rPr lang="en-US" smtClean="0"/>
               <a:pPr/>
-              <a:t>17-Dec-25</a:t>
+              <a:t>18-Dec-25</a:t>
             </a:fld>
             <a:endParaRPr lang="en-US"/>
           </a:p>
@@ -12107,7 +12073,7 @@
             <a:fld id="{D86B3AB3-BDCC-41BF-8781-963E853753C3}" type="datetime1">
               <a:rPr lang="en-US" smtClean="0"/>
               <a:pPr/>
-              <a:t>17-Dec-25</a:t>
+              <a:t>18-Dec-25</a:t>
             </a:fld>
             <a:endParaRPr lang="en-US"/>
           </a:p>
@@ -13017,7 +12983,7 @@
             <a:fld id="{D86B3AB3-BDCC-41BF-8781-963E853753C3}" type="datetime1">
               <a:rPr lang="en-US" smtClean="0"/>
               <a:pPr/>
-              <a:t>17-Dec-25</a:t>
+              <a:t>18-Dec-25</a:t>
             </a:fld>
             <a:endParaRPr lang="en-US"/>
           </a:p>
@@ -14464,7 +14430,7 @@
             <a:fld id="{D86B3AB3-BDCC-41BF-8781-963E853753C3}" type="datetime1">
               <a:rPr lang="en-US" smtClean="0"/>
               <a:pPr/>
-              <a:t>17-Dec-25</a:t>
+              <a:t>18-Dec-25</a:t>
             </a:fld>
             <a:endParaRPr lang="en-US"/>
           </a:p>
@@ -15683,7 +15649,7 @@
             <a:fld id="{D86B3AB3-BDCC-41BF-8781-963E853753C3}" type="datetime1">
               <a:rPr lang="en-US" smtClean="0"/>
               <a:pPr/>
-              <a:t>17-Dec-25</a:t>
+              <a:t>18-Dec-25</a:t>
             </a:fld>
             <a:endParaRPr lang="en-US"/>
           </a:p>
@@ -16504,7 +16470,7 @@
             <a:fld id="{D86B3AB3-BDCC-41BF-8781-963E853753C3}" type="datetime1">
               <a:rPr lang="en-US" smtClean="0"/>
               <a:pPr/>
-              <a:t>17-Dec-25</a:t>
+              <a:t>18-Dec-25</a:t>
             </a:fld>
             <a:endParaRPr lang="en-US"/>
           </a:p>
@@ -17714,7 +17680,7 @@
             <a:fld id="{D86B3AB3-BDCC-41BF-8781-963E853753C3}" type="datetime1">
               <a:rPr lang="en-US" smtClean="0"/>
               <a:pPr/>
-              <a:t>17-Dec-25</a:t>
+              <a:t>18-Dec-25</a:t>
             </a:fld>
             <a:endParaRPr lang="en-US"/>
           </a:p>
@@ -18558,7 +18524,7 @@
             <a:fld id="{D86B3AB3-BDCC-41BF-8781-963E853753C3}" type="datetime1">
               <a:rPr lang="en-US" smtClean="0"/>
               <a:pPr/>
-              <a:t>17-Dec-25</a:t>
+              <a:t>18-Dec-25</a:t>
             </a:fld>
             <a:endParaRPr lang="en-US"/>
           </a:p>
@@ -19263,7 +19229,7 @@
             <a:fld id="{D86B3AB3-BDCC-41BF-8781-963E853753C3}" type="datetime1">
               <a:rPr lang="en-US" smtClean="0"/>
               <a:pPr/>
-              <a:t>17-Dec-25</a:t>
+              <a:t>18-Dec-25</a:t>
             </a:fld>
             <a:endParaRPr lang="en-US"/>
           </a:p>
@@ -19989,7 +19955,7 @@
             <a:fld id="{D86B3AB3-BDCC-41BF-8781-963E853753C3}" type="datetime1">
               <a:rPr lang="en-US" smtClean="0"/>
               <a:pPr/>
-              <a:t>17-Dec-25</a:t>
+              <a:t>18-Dec-25</a:t>
             </a:fld>
             <a:endParaRPr lang="en-US"/>
           </a:p>
@@ -20789,7 +20755,7 @@
             <a:fld id="{D86B3AB3-BDCC-41BF-8781-963E853753C3}" type="datetime1">
               <a:rPr lang="en-US" smtClean="0"/>
               <a:pPr/>
-              <a:t>17-Dec-25</a:t>
+              <a:t>18-Dec-25</a:t>
             </a:fld>
             <a:endParaRPr lang="en-US"/>
           </a:p>
@@ -21592,7 +21558,7 @@
             <a:fld id="{D86B3AB3-BDCC-41BF-8781-963E853753C3}" type="datetime1">
               <a:rPr lang="en-US" smtClean="0"/>
               <a:pPr/>
-              <a:t>17-Dec-25</a:t>
+              <a:t>18-Dec-25</a:t>
             </a:fld>
             <a:endParaRPr lang="en-US"/>
           </a:p>
@@ -24566,7 +24532,7 @@
             <a:fld id="{D86B3AB3-BDCC-41BF-8781-963E853753C3}" type="datetime1">
               <a:rPr lang="en-US" smtClean="0"/>
               <a:pPr/>
-              <a:t>17-Dec-25</a:t>
+              <a:t>18-Dec-25</a:t>
             </a:fld>
             <a:endParaRPr lang="en-US"/>
           </a:p>
@@ -27696,7 +27662,7 @@
             <a:fld id="{D86B3AB3-BDCC-41BF-8781-963E853753C3}" type="datetime1">
               <a:rPr lang="en-US" smtClean="0"/>
               <a:pPr/>
-              <a:t>17-Dec-25</a:t>
+              <a:t>18-Dec-25</a:t>
             </a:fld>
             <a:endParaRPr lang="en-US"/>
           </a:p>
@@ -28712,7 +28678,7 @@
             <a:fld id="{D86B3AB3-BDCC-41BF-8781-963E853753C3}" type="datetime1">
               <a:rPr lang="en-US" smtClean="0"/>
               <a:pPr/>
-              <a:t>17-Dec-25</a:t>
+              <a:t>18-Dec-25</a:t>
             </a:fld>
             <a:endParaRPr lang="en-US"/>
           </a:p>
@@ -30814,7 +30780,7 @@
             <a:fld id="{D86B3AB3-BDCC-41BF-8781-963E853753C3}" type="datetime1">
               <a:rPr lang="en-US" smtClean="0"/>
               <a:pPr/>
-              <a:t>17-Dec-25</a:t>
+              <a:t>18-Dec-25</a:t>
             </a:fld>
             <a:endParaRPr lang="en-US"/>
           </a:p>
@@ -33009,7 +32975,7 @@
             <a:fld id="{D86B3AB3-BDCC-41BF-8781-963E853753C3}" type="datetime1">
               <a:rPr lang="en-US" smtClean="0"/>
               <a:pPr/>
-              <a:t>17-Dec-25</a:t>
+              <a:t>18-Dec-25</a:t>
             </a:fld>
             <a:endParaRPr lang="en-US"/>
           </a:p>
@@ -34196,7 +34162,7 @@
             <a:fld id="{D86B3AB3-BDCC-41BF-8781-963E853753C3}" type="datetime1">
               <a:rPr lang="en-US" smtClean="0"/>
               <a:pPr/>
-              <a:t>17-Dec-25</a:t>
+              <a:t>18-Dec-25</a:t>
             </a:fld>
             <a:endParaRPr lang="en-US"/>
           </a:p>
@@ -35276,7 +35242,7 @@
             <a:fld id="{D86B3AB3-BDCC-41BF-8781-963E853753C3}" type="datetime1">
               <a:rPr lang="en-US" smtClean="0"/>
               <a:pPr/>
-              <a:t>17-Dec-25</a:t>
+              <a:t>18-Dec-25</a:t>
             </a:fld>
             <a:endParaRPr lang="en-US"/>
           </a:p>
@@ -36233,7 +36199,7 @@
             <a:fld id="{D86B3AB3-BDCC-41BF-8781-963E853753C3}" type="datetime1">
               <a:rPr lang="en-US" smtClean="0"/>
               <a:pPr/>
-              <a:t>17-Dec-25</a:t>
+              <a:t>18-Dec-25</a:t>
             </a:fld>
             <a:endParaRPr lang="en-US"/>
           </a:p>
@@ -37136,7 +37102,7 @@
             <a:fld id="{D86B3AB3-BDCC-41BF-8781-963E853753C3}" type="datetime1">
               <a:rPr lang="en-US" smtClean="0"/>
               <a:pPr/>
-              <a:t>17-Dec-25</a:t>
+              <a:t>18-Dec-25</a:t>
             </a:fld>
             <a:endParaRPr lang="en-US"/>
           </a:p>
@@ -38071,7 +38037,7 @@
             <a:fld id="{D86B3AB3-BDCC-41BF-8781-963E853753C3}" type="datetime1">
               <a:rPr lang="en-US" smtClean="0"/>
               <a:pPr/>
-              <a:t>17-Dec-25</a:t>
+              <a:t>18-Dec-25</a:t>
             </a:fld>
             <a:endParaRPr lang="en-US"/>
           </a:p>
@@ -39100,7 +39066,7 @@
             <a:fld id="{D86B3AB3-BDCC-41BF-8781-963E853753C3}" type="datetime1">
               <a:rPr lang="en-US" smtClean="0"/>
               <a:pPr/>
-              <a:t>17-Dec-25</a:t>
+              <a:t>18-Dec-25</a:t>
             </a:fld>
             <a:endParaRPr lang="en-US"/>
           </a:p>
@@ -39491,7 +39457,7 @@
             <a:fld id="{00D1CE85-AA59-46D7-98F4-301D80B40614}" type="datetimeFigureOut">
               <a:rPr lang="en-US" smtClean="0"/>
               <a:pPr/>
-              <a:t>17-Dec-25</a:t>
+              <a:t>18-Dec-25</a:t>
             </a:fld>
             <a:endParaRPr lang="en-US"/>
           </a:p>
@@ -40194,7 +40160,7 @@
             </a:r>
             <a:r>
               <a:rPr lang="en-US" dirty="0"/>
-              <a:t>: 80% training, 10% validation, 10% test.</a:t>
+              <a:t>: 80% train, 10% validate and 10% test.</a:t>
             </a:r>
           </a:p>
           <a:p>
@@ -40855,7 +40821,7 @@
           <a:p>
             <a:r>
               <a:rPr lang="en-US" sz="6000" dirty="0"/>
-              <a:t>2.6. Mushroom Identification Workflows</a:t>
+              <a:t>2.6. Mushroom Identification Workflow</a:t>
             </a:r>
           </a:p>
         </p:txBody>
@@ -41034,7 +41000,7 @@
           <a:p>
             <a:r>
               <a:rPr lang="en-US" sz="6000" dirty="0"/>
-              <a:t>2.6. History Workflows</a:t>
+              <a:t>2.6. History Workflow</a:t>
             </a:r>
           </a:p>
         </p:txBody>
@@ -41213,7 +41179,7 @@
           <a:p>
             <a:r>
               <a:rPr lang="en-US" sz="6000" dirty="0"/>
-              <a:t>2.6. Search Workflows</a:t>
+              <a:t>2.6. Search Workflow</a:t>
             </a:r>
           </a:p>
         </p:txBody>
@@ -41392,7 +41358,7 @@
           <a:p>
             <a:r>
               <a:rPr lang="en-US" sz="6000" dirty="0"/>
-              <a:t>2.6. Forage Map Workflows</a:t>
+              <a:t>2.6. Forage Map Workflow</a:t>
             </a:r>
           </a:p>
         </p:txBody>
@@ -42168,21 +42134,7 @@
                           <a:latin typeface="Cambria Math" panose="02040503050406030204" pitchFamily="18" charset="0"/>
                           <a:ea typeface="Cambria Math" panose="02040503050406030204" pitchFamily="18" charset="0"/>
                         </a:rPr>
-                        <m:t>=</m:t>
-                      </m:r>
-                      <m:r>
-                        <a:rPr lang="en-US" i="1">
-                          <a:latin typeface="Cambria Math" panose="02040503050406030204" pitchFamily="18" charset="0"/>
-                          <a:ea typeface="Cambria Math" panose="02040503050406030204" pitchFamily="18" charset="0"/>
-                        </a:rPr>
-                        <m:t>2</m:t>
-                      </m:r>
-                      <m:r>
-                        <a:rPr lang="en-US" i="1">
-                          <a:latin typeface="Cambria Math" panose="02040503050406030204" pitchFamily="18" charset="0"/>
-                          <a:ea typeface="Cambria Math" panose="02040503050406030204" pitchFamily="18" charset="0"/>
-                        </a:rPr>
-                        <m:t>×</m:t>
+                        <m:t>=2×</m:t>
                       </m:r>
                       <m:f>
                         <m:fPr>
@@ -42524,33 +42476,15 @@
                                   </p:childTnLst>
                                 </p:cTn>
                               </p:par>
-                            </p:childTnLst>
-                          </p:cTn>
-                        </p:par>
-                      </p:childTnLst>
-                    </p:cTn>
-                  </p:par>
-                  <p:par>
-                    <p:cTn id="11" fill="hold">
-                      <p:stCondLst>
-                        <p:cond delay="indefinite"/>
-                      </p:stCondLst>
-                      <p:childTnLst>
-                        <p:par>
-                          <p:cTn id="12" fill="hold">
-                            <p:stCondLst>
-                              <p:cond delay="0"/>
-                            </p:stCondLst>
-                            <p:childTnLst>
                               <p:par>
-                                <p:cTn id="13" presetID="10" presetClass="entr" presetSubtype="0" fill="hold" nodeType="clickEffect">
+                                <p:cTn id="11" presetID="10" presetClass="entr" presetSubtype="0" fill="hold" nodeType="withEffect">
                                   <p:stCondLst>
                                     <p:cond delay="0"/>
                                   </p:stCondLst>
                                   <p:childTnLst>
                                     <p:set>
                                       <p:cBhvr>
-                                        <p:cTn id="14" dur="1" fill="hold">
+                                        <p:cTn id="12" dur="1" fill="hold">
                                           <p:stCondLst>
                                             <p:cond delay="0"/>
                                           </p:stCondLst>
@@ -42572,7 +42506,7 @@
                                     </p:set>
                                     <p:animEffect transition="in" filter="fade">
                                       <p:cBhvr>
-                                        <p:cTn id="15" dur="250"/>
+                                        <p:cTn id="13" dur="250"/>
                                         <p:tgtEl>
                                           <p:spTgt spid="8">
                                             <p:txEl>
@@ -42586,14 +42520,14 @@
                                 </p:cTn>
                               </p:par>
                               <p:par>
-                                <p:cTn id="16" presetID="10" presetClass="entr" presetSubtype="0" fill="hold" nodeType="withEffect">
+                                <p:cTn id="14" presetID="10" presetClass="entr" presetSubtype="0" fill="hold" nodeType="withEffect">
                                   <p:stCondLst>
                                     <p:cond delay="0"/>
                                   </p:stCondLst>
                                   <p:childTnLst>
                                     <p:set>
                                       <p:cBhvr>
-                                        <p:cTn id="17" dur="1" fill="hold">
+                                        <p:cTn id="15" dur="1" fill="hold">
                                           <p:stCondLst>
                                             <p:cond delay="0"/>
                                           </p:stCondLst>
@@ -42615,7 +42549,7 @@
                                     </p:set>
                                     <p:animEffect transition="in" filter="fade">
                                       <p:cBhvr>
-                                        <p:cTn id="18" dur="250"/>
+                                        <p:cTn id="16" dur="250"/>
                                         <p:tgtEl>
                                           <p:spTgt spid="8">
                                             <p:txEl>
@@ -42628,33 +42562,15 @@
                                   </p:childTnLst>
                                 </p:cTn>
                               </p:par>
-                            </p:childTnLst>
-                          </p:cTn>
-                        </p:par>
-                      </p:childTnLst>
-                    </p:cTn>
-                  </p:par>
-                  <p:par>
-                    <p:cTn id="19" fill="hold">
-                      <p:stCondLst>
-                        <p:cond delay="indefinite"/>
-                      </p:stCondLst>
-                      <p:childTnLst>
-                        <p:par>
-                          <p:cTn id="20" fill="hold">
-                            <p:stCondLst>
-                              <p:cond delay="0"/>
-                            </p:stCondLst>
-                            <p:childTnLst>
                               <p:par>
-                                <p:cTn id="21" presetID="10" presetClass="entr" presetSubtype="0" fill="hold" nodeType="clickEffect">
+                                <p:cTn id="17" presetID="10" presetClass="entr" presetSubtype="0" fill="hold" nodeType="withEffect">
                                   <p:stCondLst>
                                     <p:cond delay="0"/>
                                   </p:stCondLst>
                                   <p:childTnLst>
                                     <p:set>
                                       <p:cBhvr>
-                                        <p:cTn id="22" dur="1" fill="hold">
+                                        <p:cTn id="18" dur="1" fill="hold">
                                           <p:stCondLst>
                                             <p:cond delay="0"/>
                                           </p:stCondLst>
@@ -42676,7 +42592,7 @@
                                     </p:set>
                                     <p:animEffect transition="in" filter="fade">
                                       <p:cBhvr>
-                                        <p:cTn id="23" dur="250"/>
+                                        <p:cTn id="19" dur="250"/>
                                         <p:tgtEl>
                                           <p:spTgt spid="8">
                                             <p:txEl>
@@ -42690,14 +42606,14 @@
                                 </p:cTn>
                               </p:par>
                               <p:par>
-                                <p:cTn id="24" presetID="10" presetClass="entr" presetSubtype="0" fill="hold" nodeType="withEffect">
+                                <p:cTn id="20" presetID="10" presetClass="entr" presetSubtype="0" fill="hold" nodeType="withEffect">
                                   <p:stCondLst>
                                     <p:cond delay="0"/>
                                   </p:stCondLst>
                                   <p:childTnLst>
                                     <p:set>
                                       <p:cBhvr>
-                                        <p:cTn id="25" dur="1" fill="hold">
+                                        <p:cTn id="21" dur="1" fill="hold">
                                           <p:stCondLst>
                                             <p:cond delay="0"/>
                                           </p:stCondLst>
@@ -42719,7 +42635,7 @@
                                     </p:set>
                                     <p:animEffect transition="in" filter="fade">
                                       <p:cBhvr>
-                                        <p:cTn id="26" dur="250"/>
+                                        <p:cTn id="22" dur="250"/>
                                         <p:tgtEl>
                                           <p:spTgt spid="8">
                                             <p:txEl>
@@ -42967,14 +42883,7 @@
                               <a:latin typeface="Cambria Math" panose="02040503050406030204" pitchFamily="18" charset="0"/>
                               <a:ea typeface="Cambria Math" panose="02040503050406030204" pitchFamily="18" charset="0"/>
                             </a:rPr>
-                            <m:t>=</m:t>
-                          </m:r>
-                          <m:r>
-                            <a:rPr lang="en-US" i="1">
-                              <a:latin typeface="Cambria Math" panose="02040503050406030204" pitchFamily="18" charset="0"/>
-                              <a:ea typeface="Cambria Math" panose="02040503050406030204" pitchFamily="18" charset="0"/>
-                            </a:rPr>
-                            <m:t>1</m:t>
+                            <m:t>=1</m:t>
                           </m:r>
                         </m:sub>
                         <m:sup>
@@ -43133,14 +43042,7 @@
                               <a:latin typeface="Cambria Math" panose="02040503050406030204" pitchFamily="18" charset="0"/>
                               <a:ea typeface="Cambria Math" panose="02040503050406030204" pitchFamily="18" charset="0"/>
                             </a:rPr>
-                            <m:t>=</m:t>
-                          </m:r>
-                          <m:r>
-                            <a:rPr lang="en-US" i="1">
-                              <a:latin typeface="Cambria Math" panose="02040503050406030204" pitchFamily="18" charset="0"/>
-                              <a:ea typeface="Cambria Math" panose="02040503050406030204" pitchFamily="18" charset="0"/>
-                            </a:rPr>
-                            <m:t>1</m:t>
+                            <m:t>=1</m:t>
                           </m:r>
                         </m:sub>
                         <m:sup>
@@ -43309,14 +43211,7 @@
                               <a:latin typeface="Cambria Math" panose="02040503050406030204" pitchFamily="18" charset="0"/>
                               <a:ea typeface="Cambria Math" panose="02040503050406030204" pitchFamily="18" charset="0"/>
                             </a:rPr>
-                            <m:t>=</m:t>
-                          </m:r>
-                          <m:r>
-                            <a:rPr lang="en-US" i="1">
-                              <a:latin typeface="Cambria Math" panose="02040503050406030204" pitchFamily="18" charset="0"/>
-                              <a:ea typeface="Cambria Math" panose="02040503050406030204" pitchFamily="18" charset="0"/>
-                            </a:rPr>
-                            <m:t>1</m:t>
+                            <m:t>=1</m:t>
                           </m:r>
                         </m:sub>
                         <m:sup>
@@ -43747,26 +43642,42 @@
           <a:lstStyle/>
           <a:p>
             <a:r>
-              <a:rPr lang="en-US" dirty="0"/>
-              <a:t>Part 1: Introduction</a:t>
+              <a:rPr lang="en-US" sz="3200" b="1" dirty="0"/>
+              <a:t>Part 1: </a:t>
             </a:r>
-          </a:p>
-          <a:p>
             <a:r>
-              <a:rPr lang="en-US" dirty="0"/>
-              <a:t>Part 2: Theoretical basis &amp; systems analysis</a:t>
+              <a:rPr lang="en-US" sz="3200" dirty="0"/>
+              <a:t>Introduction</a:t>
             </a:r>
           </a:p>
           <a:p>
             <a:r>
-              <a:rPr lang="en-US" dirty="0"/>
-              <a:t>Part 3: Implementation</a:t>
+              <a:rPr lang="en-US" sz="3200" b="1" dirty="0"/>
+              <a:t>Part 2: </a:t>
             </a:r>
-          </a:p>
-          <a:p>
             <a:r>
-              <a:rPr lang="en-US" dirty="0"/>
-              <a:t>Part 4: Conclusion</a:t>
+              <a:rPr lang="en-US" sz="3200" dirty="0"/>
+              <a:t>Theoretical Basis &amp; Systems Analysis</a:t>
+            </a:r>
+          </a:p>
+          <a:p>
+            <a:r>
+              <a:rPr lang="en-US" sz="3200" b="1" dirty="0"/>
+              <a:t>Part 3: </a:t>
+            </a:r>
+            <a:r>
+              <a:rPr lang="en-US" sz="3200" dirty="0"/>
+              <a:t>Implementation</a:t>
+            </a:r>
+          </a:p>
+          <a:p>
+            <a:r>
+              <a:rPr lang="en-US" sz="3200" b="1" dirty="0"/>
+              <a:t>Part 4: </a:t>
+            </a:r>
+            <a:r>
+              <a:rPr lang="en-US" sz="3200" dirty="0"/>
+              <a:t>Conclusion</a:t>
             </a:r>
           </a:p>
         </p:txBody>
@@ -47002,7 +46913,7 @@
           <a:p>
             <a:r>
               <a:rPr lang="en-US" b="1" noProof="0" dirty="0"/>
-              <a:t>CURRENT LIMITATIONS:</a:t>
+              <a:t>LIMITATIONS:</a:t>
             </a:r>
           </a:p>
           <a:p>
@@ -47012,15 +46923,7 @@
             </a:pPr>
             <a:r>
               <a:rPr lang="en-US" noProof="0" dirty="0"/>
-              <a:t>Limited and undiversified training data</a:t>
-            </a:r>
-            <a:r>
-              <a:rPr lang="en-US" dirty="0"/>
-              <a:t>, </a:t>
-            </a:r>
-            <a:r>
-              <a:rPr lang="en-US" noProof="0" dirty="0"/>
-              <a:t>overfitting not fully mitigated.</a:t>
+              <a:t>Limited and undiversified training data.</a:t>
             </a:r>
           </a:p>
           <a:p>
@@ -47029,9 +46932,10 @@
               <a:buChar char="•"/>
             </a:pPr>
             <a:r>
-              <a:rPr lang="en-US" noProof="0" dirty="0"/>
-              <a:t>The current ViT model has yet achieved desired accuracy on all classes</a:t>
+              <a:rPr lang="en-US" dirty="0"/>
+              <a:t>Low accuracy on certain classes</a:t>
             </a:r>
+            <a:endParaRPr lang="en-US" noProof="0" dirty="0"/>
           </a:p>
           <a:p>
             <a:pPr marL="342900" indent="-342900">
@@ -48812,7 +48716,7 @@
             </a:pPr>
             <a:r>
               <a:rPr lang="en-US" dirty="0"/>
-              <a:t>Local SQLite storage and a bundled JSON dataset.</a:t>
+              <a:t>Local SQLite storage and a bundled JSON.</a:t>
             </a:r>
           </a:p>
           <a:p>
@@ -49304,7 +49208,7 @@
           <a:p>
             <a:r>
               <a:rPr lang="en-US" sz="6000" dirty="0"/>
-              <a:t>Part 2: Theoretical basis &amp; systems analysis</a:t>
+              <a:t>Part 2: Theoretical Basis &amp; Systems Analysis</a:t>
             </a:r>
           </a:p>
         </p:txBody>
@@ -49862,16 +49766,6 @@
             </a:r>
           </a:p>
           <a:p>
-            <a:pPr marL="800100" lvl="1" indent="-342900">
-              <a:buFont typeface="Courier New" panose="02070309020205020404" pitchFamily="49" charset="0"/>
-              <a:buChar char="o"/>
-            </a:pPr>
-            <a:r>
-              <a:rPr lang="en-US" dirty="0"/>
-              <a:t>Higher accuracy than ResNet-50, EfficientNet, and MobileNet on the custom dataset</a:t>
-            </a:r>
-          </a:p>
-          <a:p>
             <a:pPr marL="342900" indent="-342900">
               <a:buFont typeface="Arial" panose="020B0604020202020204" pitchFamily="34" charset="0"/>
               <a:buChar char="•"/>
@@ -50031,49 +49925,6 @@
                                           <p:spTgt spid="3">
                                             <p:txEl>
                                               <p:pRg st="2" end="2"/>
-                                            </p:txEl>
-                                          </p:spTgt>
-                                        </p:tgtEl>
-                                      </p:cBhvr>
-                                    </p:animEffect>
-                                  </p:childTnLst>
-                                </p:cTn>
-                              </p:par>
-                              <p:par>
-                                <p:cTn id="14" presetID="10" presetClass="entr" presetSubtype="0" fill="hold" nodeType="withEffect">
-                                  <p:stCondLst>
-                                    <p:cond delay="0"/>
-                                  </p:stCondLst>
-                                  <p:childTnLst>
-                                    <p:set>
-                                      <p:cBhvr>
-                                        <p:cTn id="15" dur="1" fill="hold">
-                                          <p:stCondLst>
-                                            <p:cond delay="0"/>
-                                          </p:stCondLst>
-                                        </p:cTn>
-                                        <p:tgtEl>
-                                          <p:spTgt spid="3">
-                                            <p:txEl>
-                                              <p:pRg st="3" end="3"/>
-                                            </p:txEl>
-                                          </p:spTgt>
-                                        </p:tgtEl>
-                                        <p:attrNameLst>
-                                          <p:attrName>style.visibility</p:attrName>
-                                        </p:attrNameLst>
-                                      </p:cBhvr>
-                                      <p:to>
-                                        <p:strVal val="visible"/>
-                                      </p:to>
-                                    </p:set>
-                                    <p:animEffect transition="in" filter="fade">
-                                      <p:cBhvr>
-                                        <p:cTn id="16" dur="250"/>
-                                        <p:tgtEl>
-                                          <p:spTgt spid="3">
-                                            <p:txEl>
-                                              <p:pRg st="3" end="3"/>
                                             </p:txEl>
                                           </p:spTgt>
                                         </p:tgtEl>

</xml_diff>